<commit_message>
Changed 'variable' to 'descriptor' in figure 1.
</commit_message>
<xml_diff>
--- a/manuscript/figure_1/figure_1_processing_workflow.pptx
+++ b/manuscript/figure_1/figure_1_processing_workflow.pptx
@@ -272,7 +272,7 @@
           <a:p>
             <a:fld id="{62C13ED9-5D7E-B342-AC41-9C031CB5D1DC}" type="datetimeFigureOut">
               <a:rPr lang="en-US" smtClean="0"/>
-              <a:t>6/29/21</a:t>
+              <a:t>11/25/21</a:t>
             </a:fld>
             <a:endParaRPr lang="en-US"/>
           </a:p>
@@ -472,7 +472,7 @@
           <a:p>
             <a:fld id="{62C13ED9-5D7E-B342-AC41-9C031CB5D1DC}" type="datetimeFigureOut">
               <a:rPr lang="en-US" smtClean="0"/>
-              <a:t>6/29/21</a:t>
+              <a:t>11/25/21</a:t>
             </a:fld>
             <a:endParaRPr lang="en-US"/>
           </a:p>
@@ -682,7 +682,7 @@
           <a:p>
             <a:fld id="{62C13ED9-5D7E-B342-AC41-9C031CB5D1DC}" type="datetimeFigureOut">
               <a:rPr lang="en-US" smtClean="0"/>
-              <a:t>6/29/21</a:t>
+              <a:t>11/25/21</a:t>
             </a:fld>
             <a:endParaRPr lang="en-US"/>
           </a:p>
@@ -882,7 +882,7 @@
           <a:p>
             <a:fld id="{62C13ED9-5D7E-B342-AC41-9C031CB5D1DC}" type="datetimeFigureOut">
               <a:rPr lang="en-US" smtClean="0"/>
-              <a:t>6/29/21</a:t>
+              <a:t>11/25/21</a:t>
             </a:fld>
             <a:endParaRPr lang="en-US"/>
           </a:p>
@@ -1158,7 +1158,7 @@
           <a:p>
             <a:fld id="{62C13ED9-5D7E-B342-AC41-9C031CB5D1DC}" type="datetimeFigureOut">
               <a:rPr lang="en-US" smtClean="0"/>
-              <a:t>6/29/21</a:t>
+              <a:t>11/25/21</a:t>
             </a:fld>
             <a:endParaRPr lang="en-US"/>
           </a:p>
@@ -1426,7 +1426,7 @@
           <a:p>
             <a:fld id="{62C13ED9-5D7E-B342-AC41-9C031CB5D1DC}" type="datetimeFigureOut">
               <a:rPr lang="en-US" smtClean="0"/>
-              <a:t>6/29/21</a:t>
+              <a:t>11/25/21</a:t>
             </a:fld>
             <a:endParaRPr lang="en-US"/>
           </a:p>
@@ -1841,7 +1841,7 @@
           <a:p>
             <a:fld id="{62C13ED9-5D7E-B342-AC41-9C031CB5D1DC}" type="datetimeFigureOut">
               <a:rPr lang="en-US" smtClean="0"/>
-              <a:t>6/29/21</a:t>
+              <a:t>11/25/21</a:t>
             </a:fld>
             <a:endParaRPr lang="en-US"/>
           </a:p>
@@ -1983,7 +1983,7 @@
           <a:p>
             <a:fld id="{62C13ED9-5D7E-B342-AC41-9C031CB5D1DC}" type="datetimeFigureOut">
               <a:rPr lang="en-US" smtClean="0"/>
-              <a:t>6/29/21</a:t>
+              <a:t>11/25/21</a:t>
             </a:fld>
             <a:endParaRPr lang="en-US"/>
           </a:p>
@@ -2096,7 +2096,7 @@
           <a:p>
             <a:fld id="{62C13ED9-5D7E-B342-AC41-9C031CB5D1DC}" type="datetimeFigureOut">
               <a:rPr lang="en-US" smtClean="0"/>
-              <a:t>6/29/21</a:t>
+              <a:t>11/25/21</a:t>
             </a:fld>
             <a:endParaRPr lang="en-US"/>
           </a:p>
@@ -2409,7 +2409,7 @@
           <a:p>
             <a:fld id="{62C13ED9-5D7E-B342-AC41-9C031CB5D1DC}" type="datetimeFigureOut">
               <a:rPr lang="en-US" smtClean="0"/>
-              <a:t>6/29/21</a:t>
+              <a:t>11/25/21</a:t>
             </a:fld>
             <a:endParaRPr lang="en-US"/>
           </a:p>
@@ -2698,7 +2698,7 @@
           <a:p>
             <a:fld id="{62C13ED9-5D7E-B342-AC41-9C031CB5D1DC}" type="datetimeFigureOut">
               <a:rPr lang="en-US" smtClean="0"/>
-              <a:t>6/29/21</a:t>
+              <a:t>11/25/21</a:t>
             </a:fld>
             <a:endParaRPr lang="en-US"/>
           </a:p>
@@ -2941,7 +2941,7 @@
           <a:p>
             <a:fld id="{62C13ED9-5D7E-B342-AC41-9C031CB5D1DC}" type="datetimeFigureOut">
               <a:rPr lang="en-US" smtClean="0"/>
-              <a:t>6/29/21</a:t>
+              <a:t>11/25/21</a:t>
             </a:fld>
             <a:endParaRPr lang="en-US"/>
           </a:p>
@@ -3688,7 +3688,7 @@
               <a:rPr lang="en-US" sz="1200" dirty="0">
                 <a:latin typeface="Helvetica" pitchFamily="2" charset="0"/>
               </a:rPr>
-              <a:t>Variable extractions</a:t>
+              <a:t>Descriptor extractions</a:t>
             </a:r>
           </a:p>
           <a:p>
@@ -3814,7 +3814,7 @@
               <a:rPr lang="en-US" sz="1200" dirty="0">
                 <a:latin typeface="Helvetica" pitchFamily="2" charset="0"/>
               </a:rPr>
-              <a:t>Variable extractions</a:t>
+              <a:t>Descriptor extractions</a:t>
             </a:r>
           </a:p>
           <a:p>

</xml_diff>